<commit_message>
API updated. TechTalk pptx updates
</commit_message>
<xml_diff>
--- a/Tech Talk.pptx
+++ b/Tech Talk.pptx
@@ -113,6 +113,11 @@
       </a:defRPr>
     </a:lvl9pPr>
   </p:defaultTextStyle>
+  <p:extLst>
+    <p:ext uri="{EFAFB233-063F-42B5-8137-9DF3F51BA10A}">
+      <p15:sldGuideLst xmlns:p15="http://schemas.microsoft.com/office/powerpoint/2012/main"/>
+    </p:ext>
+  </p:extLst>
 </p:presentation>
 </file>
 
@@ -384,7 +389,7 @@
           <a:p>
             <a:fld id="{D888C690-6CF8-494E-A938-FB5694A60F85}" type="datetimeFigureOut">
               <a:rPr lang="en-US" smtClean="0"/>
-              <a:t>2/9/2020</a:t>
+              <a:t>2/10/2020</a:t>
             </a:fld>
             <a:endParaRPr lang="en-US"/>
           </a:p>
@@ -659,7 +664,7 @@
           <a:p>
             <a:fld id="{D888C690-6CF8-494E-A938-FB5694A60F85}" type="datetimeFigureOut">
               <a:rPr lang="en-US" smtClean="0"/>
-              <a:t>2/9/2020</a:t>
+              <a:t>2/10/2020</a:t>
             </a:fld>
             <a:endParaRPr lang="en-US"/>
           </a:p>
@@ -853,7 +858,7 @@
           <a:p>
             <a:fld id="{D888C690-6CF8-494E-A938-FB5694A60F85}" type="datetimeFigureOut">
               <a:rPr lang="en-US" smtClean="0"/>
-              <a:t>2/9/2020</a:t>
+              <a:t>2/10/2020</a:t>
             </a:fld>
             <a:endParaRPr lang="en-US"/>
           </a:p>
@@ -1126,7 +1131,7 @@
           <a:p>
             <a:fld id="{D888C690-6CF8-494E-A938-FB5694A60F85}" type="datetimeFigureOut">
               <a:rPr lang="en-US" smtClean="0"/>
-              <a:t>2/9/2020</a:t>
+              <a:t>2/10/2020</a:t>
             </a:fld>
             <a:endParaRPr lang="en-US"/>
           </a:p>
@@ -1467,7 +1472,7 @@
           <a:p>
             <a:fld id="{D888C690-6CF8-494E-A938-FB5694A60F85}" type="datetimeFigureOut">
               <a:rPr lang="en-US" smtClean="0"/>
-              <a:t>2/9/2020</a:t>
+              <a:t>2/10/2020</a:t>
             </a:fld>
             <a:endParaRPr lang="en-US"/>
           </a:p>
@@ -2090,7 +2095,7 @@
           <a:p>
             <a:fld id="{D888C690-6CF8-494E-A938-FB5694A60F85}" type="datetimeFigureOut">
               <a:rPr lang="en-US" smtClean="0"/>
-              <a:t>2/9/2020</a:t>
+              <a:t>2/10/2020</a:t>
             </a:fld>
             <a:endParaRPr lang="en-US"/>
           </a:p>
@@ -2950,7 +2955,7 @@
           <a:p>
             <a:fld id="{D888C690-6CF8-494E-A938-FB5694A60F85}" type="datetimeFigureOut">
               <a:rPr lang="en-US" smtClean="0"/>
-              <a:t>2/9/2020</a:t>
+              <a:t>2/10/2020</a:t>
             </a:fld>
             <a:endParaRPr lang="en-US"/>
           </a:p>
@@ -3120,7 +3125,7 @@
           <a:p>
             <a:fld id="{D888C690-6CF8-494E-A938-FB5694A60F85}" type="datetimeFigureOut">
               <a:rPr lang="en-US" smtClean="0"/>
-              <a:t>2/9/2020</a:t>
+              <a:t>2/10/2020</a:t>
             </a:fld>
             <a:endParaRPr lang="en-US"/>
           </a:p>
@@ -3300,7 +3305,7 @@
           <a:p>
             <a:fld id="{D888C690-6CF8-494E-A938-FB5694A60F85}" type="datetimeFigureOut">
               <a:rPr lang="en-US" smtClean="0"/>
-              <a:t>2/9/2020</a:t>
+              <a:t>2/10/2020</a:t>
             </a:fld>
             <a:endParaRPr lang="en-US"/>
           </a:p>
@@ -3470,7 +3475,7 @@
           <a:p>
             <a:fld id="{D888C690-6CF8-494E-A938-FB5694A60F85}" type="datetimeFigureOut">
               <a:rPr lang="en-US" smtClean="0"/>
-              <a:t>2/9/2020</a:t>
+              <a:t>2/10/2020</a:t>
             </a:fld>
             <a:endParaRPr lang="en-US"/>
           </a:p>
@@ -3717,7 +3722,7 @@
           <a:p>
             <a:fld id="{D888C690-6CF8-494E-A938-FB5694A60F85}" type="datetimeFigureOut">
               <a:rPr lang="en-US" smtClean="0"/>
-              <a:t>2/9/2020</a:t>
+              <a:t>2/10/2020</a:t>
             </a:fld>
             <a:endParaRPr lang="en-US"/>
           </a:p>
@@ -4009,7 +4014,7 @@
           <a:p>
             <a:fld id="{D888C690-6CF8-494E-A938-FB5694A60F85}" type="datetimeFigureOut">
               <a:rPr lang="en-US" smtClean="0"/>
-              <a:t>2/9/2020</a:t>
+              <a:t>2/10/2020</a:t>
             </a:fld>
             <a:endParaRPr lang="en-US"/>
           </a:p>
@@ -4453,7 +4458,7 @@
           <a:p>
             <a:fld id="{D888C690-6CF8-494E-A938-FB5694A60F85}" type="datetimeFigureOut">
               <a:rPr lang="en-US" smtClean="0"/>
-              <a:t>2/9/2020</a:t>
+              <a:t>2/10/2020</a:t>
             </a:fld>
             <a:endParaRPr lang="en-US"/>
           </a:p>
@@ -4571,7 +4576,7 @@
           <a:p>
             <a:fld id="{D888C690-6CF8-494E-A938-FB5694A60F85}" type="datetimeFigureOut">
               <a:rPr lang="en-US" smtClean="0"/>
-              <a:t>2/9/2020</a:t>
+              <a:t>2/10/2020</a:t>
             </a:fld>
             <a:endParaRPr lang="en-US"/>
           </a:p>
@@ -4666,7 +4671,7 @@
           <a:p>
             <a:fld id="{D888C690-6CF8-494E-A938-FB5694A60F85}" type="datetimeFigureOut">
               <a:rPr lang="en-US" smtClean="0"/>
-              <a:t>2/9/2020</a:t>
+              <a:t>2/10/2020</a:t>
             </a:fld>
             <a:endParaRPr lang="en-US"/>
           </a:p>
@@ -4945,7 +4950,7 @@
           <a:p>
             <a:fld id="{D888C690-6CF8-494E-A938-FB5694A60F85}" type="datetimeFigureOut">
               <a:rPr lang="en-US" smtClean="0"/>
-              <a:t>2/9/2020</a:t>
+              <a:t>2/10/2020</a:t>
             </a:fld>
             <a:endParaRPr lang="en-US"/>
           </a:p>
@@ -5220,7 +5225,7 @@
           <a:p>
             <a:fld id="{D888C690-6CF8-494E-A938-FB5694A60F85}" type="datetimeFigureOut">
               <a:rPr lang="en-US" smtClean="0"/>
-              <a:t>2/9/2020</a:t>
+              <a:t>2/10/2020</a:t>
             </a:fld>
             <a:endParaRPr lang="en-US"/>
           </a:p>
@@ -5649,7 +5654,7 @@
           <a:p>
             <a:fld id="{D888C690-6CF8-494E-A938-FB5694A60F85}" type="datetimeFigureOut">
               <a:rPr lang="en-US" smtClean="0"/>
-              <a:t>2/9/2020</a:t>
+              <a:t>2/10/2020</a:t>
             </a:fld>
             <a:endParaRPr lang="en-US"/>
           </a:p>
@@ -6767,7 +6772,56 @@
           <a:bodyPr/>
           <a:lstStyle/>
           <a:p>
+            <a:r>
+              <a:rPr lang="en-US" dirty="0"/>
+              <a:t>To begin we developed a set of questions:</a:t>
+            </a:r>
+          </a:p>
+          <a:p>
+            <a:pPr lvl="1"/>
+            <a:r>
+              <a:rPr lang="en-US" dirty="0"/>
+              <a:t>What do we want to do with our Data?</a:t>
+            </a:r>
+          </a:p>
+          <a:p>
+            <a:pPr lvl="1"/>
+            <a:r>
+              <a:rPr lang="en-US" dirty="0"/>
+              <a:t>How do we do what we want with our Data?</a:t>
+            </a:r>
+          </a:p>
+          <a:p>
+            <a:pPr lvl="1"/>
+            <a:r>
+              <a:rPr lang="en-US" dirty="0"/>
+              <a:t>What were our functional parameters</a:t>
+            </a:r>
+          </a:p>
+          <a:p>
+            <a:r>
+              <a:rPr lang="en-US" dirty="0"/>
+              <a:t>We then assessed the data that we retrieved from </a:t>
+            </a:r>
+            <a:r>
+              <a:rPr lang="en-US" dirty="0" err="1"/>
+              <a:t>CourseFinder</a:t>
+            </a:r>
             <a:endParaRPr lang="en-US" dirty="0"/>
+          </a:p>
+          <a:p>
+            <a:pPr lvl="1"/>
+            <a:r>
+              <a:rPr lang="en-US" dirty="0"/>
+              <a:t>From there we formed methods based on the parameters of our project</a:t>
+            </a:r>
+          </a:p>
+          <a:p>
+            <a:pPr lvl="1"/>
+            <a:r>
+              <a:rPr lang="en-US" dirty="0"/>
+              <a:t>We then refactored the method into a working format</a:t>
+            </a:r>
           </a:p>
         </p:txBody>
       </p:sp>
@@ -6973,7 +7027,7 @@
           <a:p>
             <a:r>
               <a:rPr lang="en-US" dirty="0"/>
-              <a:t>Python3, </a:t>
+              <a:t>We are utilizing Python3 and the </a:t>
             </a:r>
             <a:r>
               <a:rPr lang="en-US" dirty="0" err="1"/>
@@ -6981,19 +7035,29 @@
             </a:r>
             <a:r>
               <a:rPr lang="en-US" dirty="0"/>
-              <a:t> and </a:t>
-            </a:r>
-            <a:r>
-              <a:rPr lang="en-US" dirty="0" err="1"/>
-              <a:t>BeautifulSoup</a:t>
-            </a:r>
-            <a:endParaRPr lang="en-US" dirty="0"/>
-          </a:p>
-          <a:p>
+              <a:t> and BeautifulSoup4 libraries.</a:t>
+            </a:r>
+          </a:p>
+          <a:p>
+            <a:pPr lvl="1"/>
             <a:r>
               <a:rPr lang="en-US" dirty="0" err="1"/>
               <a:t>MechanicalSoup</a:t>
             </a:r>
+            <a:r>
+              <a:rPr lang="en-US" dirty="0"/>
+              <a:t>: Is a library for automating interactions with websites</a:t>
+            </a:r>
+          </a:p>
+          <a:p>
+            <a:pPr lvl="1"/>
+            <a:r>
+              <a:rPr lang="en-US" dirty="0"/>
+              <a:t>BeautifulSoup4: Is a library that makes it easy to scrape information from webpages using XML/HTML parsers.</a:t>
+            </a:r>
+          </a:p>
+          <a:p>
+            <a:pPr lvl="1"/>
             <a:endParaRPr lang="en-US" dirty="0"/>
           </a:p>
         </p:txBody>
@@ -7077,7 +7141,7 @@
           <a:bodyPr/>
           <a:lstStyle/>
           <a:p>
-            <a:endParaRPr lang="en-US"/>
+            <a:endParaRPr lang="en-US" dirty="0"/>
           </a:p>
         </p:txBody>
       </p:sp>
@@ -7425,6 +7489,21 @@
 </file>
 
 <file path=customXml/item1.xml><?xml version="1.0" encoding="utf-8"?>
+<p:properties xmlns:p="http://schemas.microsoft.com/office/2006/metadata/properties" xmlns:xsi="http://www.w3.org/2001/XMLSchema-instance" xmlns:pc="http://schemas.microsoft.com/office/infopath/2007/PartnerControls">
+  <documentManagement/>
+</p:properties>
+</file>
+
+<file path=customXml/item2.xml><?xml version="1.0" encoding="utf-8"?>
+<?mso-contentType ?>
+<FormTemplates xmlns="http://schemas.microsoft.com/sharepoint/v3/contenttype/forms">
+  <Display>DocumentLibraryForm</Display>
+  <Edit>DocumentLibraryForm</Edit>
+  <New>DocumentLibraryForm</New>
+</FormTemplates>
+</file>
+
+<file path=customXml/item3.xml><?xml version="1.0" encoding="utf-8"?>
 <ct:contentTypeSchema xmlns:ct="http://schemas.microsoft.com/office/2006/metadata/contentType" xmlns:ma="http://schemas.microsoft.com/office/2006/metadata/properties/metaAttributes" ct:_="" ma:_="" ma:contentTypeName="Document" ma:contentTypeID="0x010100BEEBF58DA7ACF546B52F7DC35F885A74" ma:contentTypeVersion="12" ma:contentTypeDescription="Create a new document." ma:contentTypeScope="" ma:versionID="fefacf3eab739b6dc217ebcfcd9fa982">
   <xsd:schema xmlns:xsd="http://www.w3.org/2001/XMLSchema" xmlns:xs="http://www.w3.org/2001/XMLSchema" xmlns:p="http://schemas.microsoft.com/office/2006/metadata/properties" xmlns:ns3="689315d9-f3ba-4538-b3da-5d249f3e5a19" xmlns:ns4="532b6232-5cb5-478e-bcb0-cf5d6083b056" targetNamespace="http://schemas.microsoft.com/office/2006/metadata/properties" ma:root="true" ma:fieldsID="cb6cd4daaf1dedecfa5d2a1de8387c2e" ns3:_="" ns4:_="">
     <xsd:import namespace="689315d9-f3ba-4538-b3da-5d249f3e5a19"/>
@@ -7641,22 +7720,32 @@
 </ct:contentTypeSchema>
 </file>
 
-<file path=customXml/item2.xml><?xml version="1.0" encoding="utf-8"?>
-<?mso-contentType ?>
-<FormTemplates xmlns="http://schemas.microsoft.com/sharepoint/v3/contenttype/forms">
-  <Display>DocumentLibraryForm</Display>
-  <Edit>DocumentLibraryForm</Edit>
-  <New>DocumentLibraryForm</New>
-</FormTemplates>
+<file path=customXml/itemProps1.xml><?xml version="1.0" encoding="utf-8"?>
+<ds:datastoreItem xmlns:ds="http://schemas.openxmlformats.org/officeDocument/2006/customXml" ds:itemID="{636F94E6-9ABD-4CBE-987D-566F057A0C88}">
+  <ds:schemaRefs>
+    <ds:schemaRef ds:uri="http://purl.org/dc/terms/"/>
+    <ds:schemaRef ds:uri="http://schemas.openxmlformats.org/package/2006/metadata/core-properties"/>
+    <ds:schemaRef ds:uri="http://schemas.microsoft.com/office/2006/documentManagement/types"/>
+    <ds:schemaRef ds:uri="http://schemas.microsoft.com/office/infopath/2007/PartnerControls"/>
+    <ds:schemaRef ds:uri="http://purl.org/dc/elements/1.1/"/>
+    <ds:schemaRef ds:uri="http://schemas.microsoft.com/office/2006/metadata/properties"/>
+    <ds:schemaRef ds:uri="http://www.w3.org/XML/1998/namespace"/>
+    <ds:schemaRef ds:uri="532b6232-5cb5-478e-bcb0-cf5d6083b056"/>
+    <ds:schemaRef ds:uri="689315d9-f3ba-4538-b3da-5d249f3e5a19"/>
+    <ds:schemaRef ds:uri="http://purl.org/dc/dcmitype/"/>
+  </ds:schemaRefs>
+</ds:datastoreItem>
 </file>
 
-<file path=customXml/item3.xml><?xml version="1.0" encoding="utf-8"?>
-<p:properties xmlns:p="http://schemas.microsoft.com/office/2006/metadata/properties" xmlns:xsi="http://www.w3.org/2001/XMLSchema-instance" xmlns:pc="http://schemas.microsoft.com/office/infopath/2007/PartnerControls">
-  <documentManagement/>
-</p:properties>
+<file path=customXml/itemProps2.xml><?xml version="1.0" encoding="utf-8"?>
+<ds:datastoreItem xmlns:ds="http://schemas.openxmlformats.org/officeDocument/2006/customXml" ds:itemID="{C2DEF531-934C-496A-8E8B-9D2A9B3BD1DB}">
+  <ds:schemaRefs>
+    <ds:schemaRef ds:uri="http://schemas.microsoft.com/sharepoint/v3/contenttype/forms"/>
+  </ds:schemaRefs>
+</ds:datastoreItem>
 </file>
 
-<file path=customXml/itemProps1.xml><?xml version="1.0" encoding="utf-8"?>
+<file path=customXml/itemProps3.xml><?xml version="1.0" encoding="utf-8"?>
 <ds:datastoreItem xmlns:ds="http://schemas.openxmlformats.org/officeDocument/2006/customXml" ds:itemID="{4AA512E8-0121-42F9-BC05-E0F5A2B0E600}">
   <ds:schemaRefs>
     <ds:schemaRef ds:uri="http://schemas.microsoft.com/office/2006/metadata/contentType"/>
@@ -7673,29 +7762,4 @@
     <ds:schemaRef ds:uri="http://schemas.microsoft.com/internal/obd"/>
   </ds:schemaRefs>
 </ds:datastoreItem>
-</file>
-
-<file path=customXml/itemProps2.xml><?xml version="1.0" encoding="utf-8"?>
-<ds:datastoreItem xmlns:ds="http://schemas.openxmlformats.org/officeDocument/2006/customXml" ds:itemID="{C2DEF531-934C-496A-8E8B-9D2A9B3BD1DB}">
-  <ds:schemaRefs>
-    <ds:schemaRef ds:uri="http://schemas.microsoft.com/sharepoint/v3/contenttype/forms"/>
-  </ds:schemaRefs>
-</ds:datastoreItem>
-</file>
-
-<file path=customXml/itemProps3.xml><?xml version="1.0" encoding="utf-8"?>
-<ds:datastoreItem xmlns:ds="http://schemas.openxmlformats.org/officeDocument/2006/customXml" ds:itemID="{636F94E6-9ABD-4CBE-987D-566F057A0C88}">
-  <ds:schemaRefs>
-    <ds:schemaRef ds:uri="http://purl.org/dc/terms/"/>
-    <ds:schemaRef ds:uri="http://schemas.openxmlformats.org/package/2006/metadata/core-properties"/>
-    <ds:schemaRef ds:uri="http://schemas.microsoft.com/office/2006/documentManagement/types"/>
-    <ds:schemaRef ds:uri="http://schemas.microsoft.com/office/infopath/2007/PartnerControls"/>
-    <ds:schemaRef ds:uri="http://purl.org/dc/elements/1.1/"/>
-    <ds:schemaRef ds:uri="http://schemas.microsoft.com/office/2006/metadata/properties"/>
-    <ds:schemaRef ds:uri="http://www.w3.org/XML/1998/namespace"/>
-    <ds:schemaRef ds:uri="532b6232-5cb5-478e-bcb0-cf5d6083b056"/>
-    <ds:schemaRef ds:uri="689315d9-f3ba-4538-b3da-5d249f3e5a19"/>
-    <ds:schemaRef ds:uri="http://purl.org/dc/dcmitype/"/>
-  </ds:schemaRefs>
-</ds:datastoreItem>
 </file>
</xml_diff>